<commit_message>
Made the state names a little more clear.
</commit_message>
<xml_diff>
--- a/blackjack/docs/Blackjack Design v1.pptx
+++ b/blackjack/docs/Blackjack Design v1.pptx
@@ -251,7 +251,7 @@
           <a:p>
             <a:fld id="{A0C51612-866F-4C57-819C-608D842E3E9E}" type="datetimeFigureOut">
               <a:rPr lang="en-US" smtClean="0"/>
-              <a:t>5/8/2013</a:t>
+              <a:t>5/13/2013</a:t>
             </a:fld>
             <a:endParaRPr lang="en-US"/>
           </a:p>
@@ -421,7 +421,7 @@
           <a:p>
             <a:fld id="{A0C51612-866F-4C57-819C-608D842E3E9E}" type="datetimeFigureOut">
               <a:rPr lang="en-US" smtClean="0"/>
-              <a:t>5/8/2013</a:t>
+              <a:t>5/13/2013</a:t>
             </a:fld>
             <a:endParaRPr lang="en-US"/>
           </a:p>
@@ -601,7 +601,7 @@
           <a:p>
             <a:fld id="{A0C51612-866F-4C57-819C-608D842E3E9E}" type="datetimeFigureOut">
               <a:rPr lang="en-US" smtClean="0"/>
-              <a:t>5/8/2013</a:t>
+              <a:t>5/13/2013</a:t>
             </a:fld>
             <a:endParaRPr lang="en-US"/>
           </a:p>
@@ -771,7 +771,7 @@
           <a:p>
             <a:fld id="{A0C51612-866F-4C57-819C-608D842E3E9E}" type="datetimeFigureOut">
               <a:rPr lang="en-US" smtClean="0"/>
-              <a:t>5/8/2013</a:t>
+              <a:t>5/13/2013</a:t>
             </a:fld>
             <a:endParaRPr lang="en-US"/>
           </a:p>
@@ -1017,7 +1017,7 @@
           <a:p>
             <a:fld id="{A0C51612-866F-4C57-819C-608D842E3E9E}" type="datetimeFigureOut">
               <a:rPr lang="en-US" smtClean="0"/>
-              <a:t>5/8/2013</a:t>
+              <a:t>5/13/2013</a:t>
             </a:fld>
             <a:endParaRPr lang="en-US"/>
           </a:p>
@@ -1249,7 +1249,7 @@
           <a:p>
             <a:fld id="{A0C51612-866F-4C57-819C-608D842E3E9E}" type="datetimeFigureOut">
               <a:rPr lang="en-US" smtClean="0"/>
-              <a:t>5/8/2013</a:t>
+              <a:t>5/13/2013</a:t>
             </a:fld>
             <a:endParaRPr lang="en-US"/>
           </a:p>
@@ -1616,7 +1616,7 @@
           <a:p>
             <a:fld id="{A0C51612-866F-4C57-819C-608D842E3E9E}" type="datetimeFigureOut">
               <a:rPr lang="en-US" smtClean="0"/>
-              <a:t>5/8/2013</a:t>
+              <a:t>5/13/2013</a:t>
             </a:fld>
             <a:endParaRPr lang="en-US"/>
           </a:p>
@@ -1734,7 +1734,7 @@
           <a:p>
             <a:fld id="{A0C51612-866F-4C57-819C-608D842E3E9E}" type="datetimeFigureOut">
               <a:rPr lang="en-US" smtClean="0"/>
-              <a:t>5/8/2013</a:t>
+              <a:t>5/13/2013</a:t>
             </a:fld>
             <a:endParaRPr lang="en-US"/>
           </a:p>
@@ -1829,7 +1829,7 @@
           <a:p>
             <a:fld id="{A0C51612-866F-4C57-819C-608D842E3E9E}" type="datetimeFigureOut">
               <a:rPr lang="en-US" smtClean="0"/>
-              <a:t>5/8/2013</a:t>
+              <a:t>5/13/2013</a:t>
             </a:fld>
             <a:endParaRPr lang="en-US"/>
           </a:p>
@@ -2106,7 +2106,7 @@
           <a:p>
             <a:fld id="{A0C51612-866F-4C57-819C-608D842E3E9E}" type="datetimeFigureOut">
               <a:rPr lang="en-US" smtClean="0"/>
-              <a:t>5/8/2013</a:t>
+              <a:t>5/13/2013</a:t>
             </a:fld>
             <a:endParaRPr lang="en-US"/>
           </a:p>
@@ -2359,7 +2359,7 @@
           <a:p>
             <a:fld id="{A0C51612-866F-4C57-819C-608D842E3E9E}" type="datetimeFigureOut">
               <a:rPr lang="en-US" smtClean="0"/>
-              <a:t>5/8/2013</a:t>
+              <a:t>5/13/2013</a:t>
             </a:fld>
             <a:endParaRPr lang="en-US"/>
           </a:p>
@@ -2572,7 +2572,7 @@
           <a:p>
             <a:fld id="{A0C51612-866F-4C57-819C-608D842E3E9E}" type="datetimeFigureOut">
               <a:rPr lang="en-US" smtClean="0"/>
-              <a:t>5/8/2013</a:t>
+              <a:t>5/13/2013</a:t>
             </a:fld>
             <a:endParaRPr lang="en-US"/>
           </a:p>
@@ -3405,7 +3405,7 @@
                   <a:schemeClr val="tx1"/>
                 </a:solidFill>
               </a:rPr>
-              <a:t>Awaiting username</a:t>
+              <a:t>Waiting for username</a:t>
             </a:r>
             <a:endParaRPr lang="en-US" sz="1200" b="1" dirty="0">
               <a:solidFill>
@@ -3504,7 +3504,15 @@
                   <a:schemeClr val="tx1"/>
                 </a:solidFill>
               </a:rPr>
-              <a:t>Awaiting password</a:t>
+              <a:t>Waiting for </a:t>
+            </a:r>
+            <a:r>
+              <a:rPr lang="en-US" sz="1200" b="1" dirty="0" err="1" smtClean="0">
+                <a:solidFill>
+                  <a:schemeClr val="tx1"/>
+                </a:solidFill>
+              </a:rPr>
+              <a:t>pasword</a:t>
             </a:r>
             <a:endParaRPr lang="en-US" sz="1200" b="1" dirty="0">
               <a:solidFill>
@@ -3643,15 +3651,7 @@
                   <a:schemeClr val="tx1"/>
                 </a:solidFill>
               </a:rPr>
-              <a:t>Not in </a:t>
-            </a:r>
-            <a:r>
-              <a:rPr lang="en-US" sz="1200" b="1" dirty="0" smtClean="0">
-                <a:solidFill>
-                  <a:schemeClr val="tx1"/>
-                </a:solidFill>
-              </a:rPr>
-              <a:t>session</a:t>
+              <a:t>Not in session</a:t>
             </a:r>
             <a:endParaRPr lang="en-US" sz="1200" b="1" dirty="0">
               <a:solidFill>
@@ -3936,11 +3936,6 @@
               </a:rPr>
               <a:t>LEAVESESSION</a:t>
             </a:r>
-            <a:endParaRPr lang="en-US" sz="1400" dirty="0" smtClean="0">
-              <a:solidFill>
-                <a:srgbClr val="FF0000"/>
-              </a:solidFill>
-            </a:endParaRPr>
           </a:p>
           <a:p>
             <a:pPr algn="ctr"/>
@@ -4005,23 +4000,7 @@
                   <a:schemeClr val="tx1"/>
                 </a:solidFill>
               </a:rPr>
-              <a:t>In </a:t>
-            </a:r>
-            <a:r>
-              <a:rPr lang="en-US" sz="1200" b="1" dirty="0" smtClean="0">
-                <a:solidFill>
-                  <a:schemeClr val="tx1"/>
-                </a:solidFill>
-              </a:rPr>
-              <a:t>session, </a:t>
-            </a:r>
-            <a:r>
-              <a:rPr lang="en-US" sz="1200" b="1" dirty="0" smtClean="0">
-                <a:solidFill>
-                  <a:schemeClr val="tx1"/>
-                </a:solidFill>
-              </a:rPr>
-              <a:t>awaiting bets</a:t>
+              <a:t>In session, awaiting bets</a:t>
             </a:r>
             <a:endParaRPr lang="en-US" sz="1200" b="1" dirty="0">
               <a:solidFill>
@@ -4062,11 +4041,6 @@
               </a:rPr>
               <a:t>JOINSESSION</a:t>
             </a:r>
-            <a:endParaRPr lang="en-US" sz="1400" dirty="0" smtClean="0">
-              <a:solidFill>
-                <a:srgbClr val="FF0000"/>
-              </a:solidFill>
-            </a:endParaRPr>
           </a:p>
           <a:p>
             <a:pPr algn="ctr"/>
@@ -4139,15 +4113,7 @@
                   <a:schemeClr val="tx1"/>
                 </a:solidFill>
               </a:rPr>
-              <a:t>session, </a:t>
-            </a:r>
-            <a:r>
-              <a:rPr lang="en-US" sz="1200" b="1" dirty="0" smtClean="0">
-                <a:solidFill>
-                  <a:schemeClr val="tx1"/>
-                </a:solidFill>
-              </a:rPr>
-              <a:t>cards being dealt</a:t>
+              <a:t>session before your turn</a:t>
             </a:r>
             <a:endParaRPr lang="en-US" sz="1200" b="1" dirty="0">
               <a:solidFill>
@@ -4459,7 +4425,7 @@
                   <a:schemeClr val="tx1"/>
                 </a:solidFill>
               </a:rPr>
-              <a:t>Dealer has blackjack</a:t>
+              <a:t>In session dealer blackjack</a:t>
             </a:r>
             <a:endParaRPr lang="en-US" sz="1200" b="1" dirty="0">
               <a:solidFill>
@@ -4522,7 +4488,7 @@
                   <a:schemeClr val="tx1"/>
                 </a:solidFill>
               </a:rPr>
-              <a:t>Waiting for other players to play</a:t>
+              <a:t>In session after your turn</a:t>
             </a:r>
             <a:endParaRPr lang="en-US" sz="1200" b="1" dirty="0">
               <a:solidFill>
@@ -4661,18 +4627,7 @@
                   <a:schemeClr val="tx1"/>
                 </a:solidFill>
               </a:rPr>
-              <a:t>Awaiting play,</a:t>
-            </a:r>
-          </a:p>
-          <a:p>
-            <a:pPr algn="ctr"/>
-            <a:r>
-              <a:rPr lang="en-US" sz="1200" b="1" dirty="0" smtClean="0">
-                <a:solidFill>
-                  <a:schemeClr val="tx1"/>
-                </a:solidFill>
-              </a:rPr>
-              <a:t>No dealer blackjack</a:t>
+              <a:t>In session and your turn</a:t>
             </a:r>
             <a:endParaRPr lang="en-US" sz="1200" b="1" dirty="0">
               <a:solidFill>
@@ -5216,7 +5171,7 @@
                   <a:schemeClr val="tx1"/>
                 </a:solidFill>
               </a:rPr>
-              <a:t>Waiting for server to process results</a:t>
+              <a:t>In session server processing</a:t>
             </a:r>
             <a:endParaRPr lang="en-US" sz="1200" b="1" dirty="0">
               <a:solidFill>
@@ -5847,11 +5802,7 @@
           <a:p>
             <a:r>
               <a:rPr lang="en-US" sz="1400" i="1" dirty="0" smtClean="0"/>
-              <a:t>Or </a:t>
-            </a:r>
-            <a:r>
-              <a:rPr lang="en-US" sz="1400" i="1" dirty="0" smtClean="0"/>
-              <a:t>timeout</a:t>
+              <a:t>Or timeout</a:t>
             </a:r>
             <a:endParaRPr lang="en-US" sz="1400" i="1" dirty="0"/>
           </a:p>
@@ -6200,11 +6151,7 @@
               <a:p>
                 <a:r>
                   <a:rPr lang="en-US" sz="1400" dirty="0" smtClean="0"/>
-                  <a:t>Not-in-Session </a:t>
-                </a:r>
-                <a:r>
-                  <a:rPr lang="en-US" sz="1400" dirty="0" smtClean="0"/>
-                  <a:t>State</a:t>
+                  <a:t>Not-in-Session State</a:t>
                 </a:r>
                 <a:endParaRPr lang="en-US" dirty="0"/>
               </a:p>
@@ -6234,11 +6181,7 @@
               <a:p>
                 <a:r>
                   <a:rPr lang="en-US" sz="1400" dirty="0" smtClean="0"/>
-                  <a:t>In-Session </a:t>
-                </a:r>
-                <a:r>
-                  <a:rPr lang="en-US" sz="1400" dirty="0" smtClean="0"/>
-                  <a:t>State</a:t>
+                  <a:t>In-Session State</a:t>
                 </a:r>
                 <a:endParaRPr lang="en-US" dirty="0"/>
               </a:p>
@@ -6808,11 +6751,6 @@
                 </a:rPr>
                 <a:t>VERSION</a:t>
               </a:r>
-              <a:endParaRPr lang="en-US" sz="1400" dirty="0" smtClean="0">
-                <a:solidFill>
-                  <a:srgbClr val="FF0000"/>
-                </a:solidFill>
-              </a:endParaRPr>
             </a:p>
             <a:p>
               <a:pPr algn="ctr"/>
@@ -6855,11 +6793,6 @@
                 </a:rPr>
                 <a:t>CAPABILITIES</a:t>
               </a:r>
-              <a:endParaRPr lang="en-US" sz="1400" dirty="0" smtClean="0">
-                <a:solidFill>
-                  <a:srgbClr val="FF0000"/>
-                </a:solidFill>
-              </a:endParaRPr>
             </a:p>
             <a:p>
               <a:pPr algn="ctr"/>
@@ -6902,11 +6835,6 @@
                 </a:rPr>
                 <a:t>ACCOUNT</a:t>
               </a:r>
-              <a:endParaRPr lang="en-US" sz="1400" dirty="0" smtClean="0">
-                <a:solidFill>
-                  <a:srgbClr val="FF0000"/>
-                </a:solidFill>
-              </a:endParaRPr>
             </a:p>
             <a:p>
               <a:pPr algn="ctr"/>
@@ -6949,11 +6877,6 @@
                 </a:rPr>
                 <a:t>LISTGAMES</a:t>
               </a:r>
-              <a:endParaRPr lang="en-US" sz="1400" dirty="0" smtClean="0">
-                <a:solidFill>
-                  <a:srgbClr val="FF0000"/>
-                </a:solidFill>
-              </a:endParaRPr>
             </a:p>
             <a:p>
               <a:pPr algn="ctr"/>

</xml_diff>